<commit_message>
testing the commands !
</commit_message>
<xml_diff>
--- a/Risk Models.pptx
+++ b/Risk Models.pptx
@@ -3135,7 +3135,7 @@
           <a:p>
             <a:fld id="{E8B6CBB8-59B9-4B15-862E-9F9EA068EDD7}" type="datetimeFigureOut">
               <a:rPr lang="en-CA" smtClean="0"/>
-              <a:t>2017-04-07</a:t>
+              <a:t>2017-04-16</a:t>
             </a:fld>
             <a:endParaRPr lang="en-CA"/>
           </a:p>
@@ -3305,7 +3305,7 @@
           <a:p>
             <a:fld id="{E8B6CBB8-59B9-4B15-862E-9F9EA068EDD7}" type="datetimeFigureOut">
               <a:rPr lang="en-CA" smtClean="0"/>
-              <a:t>2017-04-07</a:t>
+              <a:t>2017-04-16</a:t>
             </a:fld>
             <a:endParaRPr lang="en-CA"/>
           </a:p>
@@ -3485,7 +3485,7 @@
           <a:p>
             <a:fld id="{E8B6CBB8-59B9-4B15-862E-9F9EA068EDD7}" type="datetimeFigureOut">
               <a:rPr lang="en-CA" smtClean="0"/>
-              <a:t>2017-04-07</a:t>
+              <a:t>2017-04-16</a:t>
             </a:fld>
             <a:endParaRPr lang="en-CA"/>
           </a:p>
@@ -3655,7 +3655,7 @@
           <a:p>
             <a:fld id="{E8B6CBB8-59B9-4B15-862E-9F9EA068EDD7}" type="datetimeFigureOut">
               <a:rPr lang="en-CA" smtClean="0"/>
-              <a:t>2017-04-07</a:t>
+              <a:t>2017-04-16</a:t>
             </a:fld>
             <a:endParaRPr lang="en-CA"/>
           </a:p>
@@ -3901,7 +3901,7 @@
           <a:p>
             <a:fld id="{E8B6CBB8-59B9-4B15-862E-9F9EA068EDD7}" type="datetimeFigureOut">
               <a:rPr lang="en-CA" smtClean="0"/>
-              <a:t>2017-04-07</a:t>
+              <a:t>2017-04-16</a:t>
             </a:fld>
             <a:endParaRPr lang="en-CA"/>
           </a:p>
@@ -4133,7 +4133,7 @@
           <a:p>
             <a:fld id="{E8B6CBB8-59B9-4B15-862E-9F9EA068EDD7}" type="datetimeFigureOut">
               <a:rPr lang="en-CA" smtClean="0"/>
-              <a:t>2017-04-07</a:t>
+              <a:t>2017-04-16</a:t>
             </a:fld>
             <a:endParaRPr lang="en-CA"/>
           </a:p>
@@ -4500,7 +4500,7 @@
           <a:p>
             <a:fld id="{E8B6CBB8-59B9-4B15-862E-9F9EA068EDD7}" type="datetimeFigureOut">
               <a:rPr lang="en-CA" smtClean="0"/>
-              <a:t>2017-04-07</a:t>
+              <a:t>2017-04-16</a:t>
             </a:fld>
             <a:endParaRPr lang="en-CA"/>
           </a:p>
@@ -4618,7 +4618,7 @@
           <a:p>
             <a:fld id="{E8B6CBB8-59B9-4B15-862E-9F9EA068EDD7}" type="datetimeFigureOut">
               <a:rPr lang="en-CA" smtClean="0"/>
-              <a:t>2017-04-07</a:t>
+              <a:t>2017-04-16</a:t>
             </a:fld>
             <a:endParaRPr lang="en-CA"/>
           </a:p>
@@ -4713,7 +4713,7 @@
           <a:p>
             <a:fld id="{E8B6CBB8-59B9-4B15-862E-9F9EA068EDD7}" type="datetimeFigureOut">
               <a:rPr lang="en-CA" smtClean="0"/>
-              <a:t>2017-04-07</a:t>
+              <a:t>2017-04-16</a:t>
             </a:fld>
             <a:endParaRPr lang="en-CA"/>
           </a:p>
@@ -4990,7 +4990,7 @@
           <a:p>
             <a:fld id="{E8B6CBB8-59B9-4B15-862E-9F9EA068EDD7}" type="datetimeFigureOut">
               <a:rPr lang="en-CA" smtClean="0"/>
-              <a:t>2017-04-07</a:t>
+              <a:t>2017-04-16</a:t>
             </a:fld>
             <a:endParaRPr lang="en-CA"/>
           </a:p>
@@ -5243,7 +5243,7 @@
           <a:p>
             <a:fld id="{E8B6CBB8-59B9-4B15-862E-9F9EA068EDD7}" type="datetimeFigureOut">
               <a:rPr lang="en-CA" smtClean="0"/>
-              <a:t>2017-04-07</a:t>
+              <a:t>2017-04-16</a:t>
             </a:fld>
             <a:endParaRPr lang="en-CA"/>
           </a:p>
@@ -5456,7 +5456,7 @@
           <a:p>
             <a:fld id="{E8B6CBB8-59B9-4B15-862E-9F9EA068EDD7}" type="datetimeFigureOut">
               <a:rPr lang="en-CA" smtClean="0"/>
-              <a:t>2017-04-07</a:t>
+              <a:t>2017-04-16</a:t>
             </a:fld>
             <a:endParaRPr lang="en-CA"/>
           </a:p>
@@ -12404,44 +12404,6 @@
           </a:p>
         </p:txBody>
       </p:sp>
-      <p:sp>
-        <p:nvSpPr>
-          <p:cNvPr id="38" name="Isosceles Triangle 37"/>
-          <p:cNvSpPr/>
-          <p:nvPr/>
-        </p:nvSpPr>
-        <p:spPr>
-          <a:xfrm>
-            <a:off x="6171656" y="3845315"/>
-            <a:ext cx="535614" cy="501506"/>
-          </a:xfrm>
-          <a:prstGeom prst="triangle">
-            <a:avLst/>
-          </a:prstGeom>
-        </p:spPr>
-        <p:style>
-          <a:lnRef idx="2">
-            <a:schemeClr val="dk1"/>
-          </a:lnRef>
-          <a:fillRef idx="1">
-            <a:schemeClr val="lt1"/>
-          </a:fillRef>
-          <a:effectRef idx="0">
-            <a:schemeClr val="dk1"/>
-          </a:effectRef>
-          <a:fontRef idx="minor">
-            <a:schemeClr val="dk1"/>
-          </a:fontRef>
-        </p:style>
-        <p:txBody>
-          <a:bodyPr rtlCol="0" anchor="ctr"/>
-          <a:lstStyle/>
-          <a:p>
-            <a:pPr algn="ctr"/>
-            <a:endParaRPr lang="en-CA" sz="800" dirty="0"/>
-          </a:p>
-        </p:txBody>
-      </p:sp>
       <p:cxnSp>
         <p:nvCxnSpPr>
           <p:cNvPr id="39" name="Straight Arrow Connector 38"/>
@@ -12516,42 +12478,6 @@
       </p:cxnSp>
       <p:cxnSp>
         <p:nvCxnSpPr>
-          <p:cNvPr id="43" name="Straight Arrow Connector 42"/>
-          <p:cNvCxnSpPr>
-            <a:stCxn id="21" idx="2"/>
-            <a:endCxn id="38" idx="0"/>
-          </p:cNvCxnSpPr>
-          <p:nvPr/>
-        </p:nvCxnSpPr>
-        <p:spPr>
-          <a:xfrm flipH="1">
-            <a:off x="6439463" y="3001823"/>
-            <a:ext cx="934051" cy="843492"/>
-          </a:xfrm>
-          <a:prstGeom prst="straightConnector1">
-            <a:avLst/>
-          </a:prstGeom>
-          <a:ln>
-            <a:tailEnd type="triangle"/>
-          </a:ln>
-        </p:spPr>
-        <p:style>
-          <a:lnRef idx="3">
-            <a:schemeClr val="dk1"/>
-          </a:lnRef>
-          <a:fillRef idx="0">
-            <a:schemeClr val="dk1"/>
-          </a:fillRef>
-          <a:effectRef idx="2">
-            <a:schemeClr val="dk1"/>
-          </a:effectRef>
-          <a:fontRef idx="minor">
-            <a:schemeClr val="tx1"/>
-          </a:fontRef>
-        </p:style>
-      </p:cxnSp>
-      <p:cxnSp>
-        <p:nvCxnSpPr>
           <p:cNvPr id="45" name="Straight Arrow Connector 44"/>
           <p:cNvCxnSpPr>
             <a:stCxn id="21" idx="2"/>
@@ -12694,14 +12620,14 @@
       </p:sp>
       <p:sp>
         <p:nvSpPr>
-          <p:cNvPr id="50" name="TextBox 49"/>
+          <p:cNvPr id="51" name="TextBox 50"/>
           <p:cNvSpPr txBox="1"/>
           <p:nvPr/>
         </p:nvSpPr>
         <p:spPr>
           <a:xfrm>
-            <a:off x="5636905" y="4411219"/>
-            <a:ext cx="1224295" cy="415498"/>
+            <a:off x="6941816" y="4452158"/>
+            <a:ext cx="678043" cy="900246"/>
           </a:xfrm>
           <a:prstGeom prst="rect">
             <a:avLst/>
@@ -12720,43 +12646,8 @@
           <a:lstStyle/>
           <a:p>
             <a:r>
-              <a:rPr lang="en-CA" sz="1050" dirty="0" smtClean="0"/>
+              <a:rPr lang="en-CA" sz="1050" dirty="0"/>
               <a:t>Clean user data for noise filter</a:t>
-            </a:r>
-            <a:endParaRPr lang="en-CA" sz="1050" dirty="0"/>
-          </a:p>
-        </p:txBody>
-      </p:sp>
-      <p:sp>
-        <p:nvSpPr>
-          <p:cNvPr id="51" name="TextBox 50"/>
-          <p:cNvSpPr txBox="1"/>
-          <p:nvPr/>
-        </p:nvSpPr>
-        <p:spPr>
-          <a:xfrm>
-            <a:off x="6941816" y="4452158"/>
-            <a:ext cx="678043" cy="577081"/>
-          </a:xfrm>
-          <a:prstGeom prst="rect">
-            <a:avLst/>
-          </a:prstGeom>
-          <a:noFill/>
-          <a:ln>
-            <a:solidFill>
-              <a:schemeClr val="bg1"/>
-            </a:solidFill>
-          </a:ln>
-        </p:spPr>
-        <p:txBody>
-          <a:bodyPr wrap="square" rtlCol="0">
-            <a:spAutoFit/>
-          </a:bodyPr>
-          <a:lstStyle/>
-          <a:p>
-            <a:r>
-              <a:rPr lang="en-CA" sz="1050" dirty="0" smtClean="0"/>
-              <a:t>Secure user data</a:t>
             </a:r>
             <a:endParaRPr lang="en-CA" sz="1050" dirty="0"/>
           </a:p>
@@ -13197,7 +13088,7 @@
         <p:spPr>
           <a:xfrm>
             <a:off x="3388564" y="1337348"/>
-            <a:ext cx="2009600" cy="577081"/>
+            <a:ext cx="2009600" cy="738664"/>
           </a:xfrm>
           <a:prstGeom prst="rect">
             <a:avLst/>
@@ -13217,7 +13108,23 @@
           <a:p>
             <a:r>
               <a:rPr lang="en-CA" sz="1050" dirty="0" smtClean="0"/>
-              <a:t>Provide user contextual information and historic data to the Recommender System</a:t>
+              <a:t>Provide</a:t>
+            </a:r>
+            <a:r>
+              <a:rPr lang="en-CA" sz="1050" dirty="0" smtClean="0"/>
+              <a:t> user’s </a:t>
+            </a:r>
+            <a:r>
+              <a:rPr lang="en-CA" sz="1050" dirty="0" smtClean="0"/>
+              <a:t>contextual information </a:t>
+            </a:r>
+            <a:r>
+              <a:rPr lang="en-CA" sz="1050" dirty="0" smtClean="0"/>
+              <a:t>and user’s </a:t>
+            </a:r>
+            <a:r>
+              <a:rPr lang="en-CA" sz="1050" dirty="0" smtClean="0"/>
+              <a:t>historic data to the Recommender System</a:t>
             </a:r>
             <a:endParaRPr lang="en-CA" sz="1050" dirty="0"/>
           </a:p>
@@ -13892,7 +13799,7 @@
         <p:spPr>
           <a:xfrm>
             <a:off x="1247809" y="4411219"/>
-            <a:ext cx="1224295" cy="415498"/>
+            <a:ext cx="1224295" cy="577081"/>
           </a:xfrm>
           <a:prstGeom prst="rect">
             <a:avLst/>
@@ -13912,7 +13819,15 @@
           <a:p>
             <a:r>
               <a:rPr lang="en-CA" sz="1050" dirty="0" smtClean="0"/>
-              <a:t>Maintain user’s privacy settings</a:t>
+              <a:t>Maintain user’s </a:t>
+            </a:r>
+            <a:r>
+              <a:rPr lang="en-CA" sz="1050" dirty="0" smtClean="0"/>
+              <a:t>contextual data privacy </a:t>
+            </a:r>
+            <a:r>
+              <a:rPr lang="en-CA" sz="1050" dirty="0" smtClean="0"/>
+              <a:t>settings</a:t>
             </a:r>
             <a:endParaRPr lang="en-CA" sz="1050" dirty="0"/>
           </a:p>
@@ -13927,7 +13842,7 @@
         <p:spPr>
           <a:xfrm>
             <a:off x="2387180" y="4428554"/>
-            <a:ext cx="1075688" cy="577081"/>
+            <a:ext cx="1075688" cy="738664"/>
           </a:xfrm>
           <a:prstGeom prst="rect">
             <a:avLst/>
@@ -13947,7 +13862,11 @@
           <a:p>
             <a:r>
               <a:rPr lang="en-CA" sz="1050" dirty="0" smtClean="0"/>
-              <a:t>Filter out Noise data from the system</a:t>
+              <a:t>Filter out </a:t>
+            </a:r>
+            <a:r>
+              <a:rPr lang="en-CA" sz="1050" dirty="0" smtClean="0"/>
+              <a:t>contextual data based on the privacy settings</a:t>
             </a:r>
             <a:endParaRPr lang="en-CA" sz="1050" dirty="0"/>
           </a:p>
@@ -13961,8 +13880,8 @@
         </p:nvSpPr>
         <p:spPr>
           <a:xfrm>
-            <a:off x="5299853" y="4527233"/>
-            <a:ext cx="881300" cy="1061829"/>
+            <a:off x="6181153" y="4460585"/>
+            <a:ext cx="881300" cy="900246"/>
           </a:xfrm>
           <a:prstGeom prst="rect">
             <a:avLst/>
@@ -13982,7 +13901,23 @@
           <a:p>
             <a:r>
               <a:rPr lang="en-CA" sz="1050" dirty="0" smtClean="0"/>
-              <a:t>Select the most appropriate historic data for the given scenario</a:t>
+              <a:t>Select </a:t>
+            </a:r>
+            <a:r>
+              <a:rPr lang="en-CA" sz="1050" dirty="0" smtClean="0"/>
+              <a:t>relevant historic </a:t>
+            </a:r>
+            <a:r>
+              <a:rPr lang="en-CA" sz="1050" dirty="0" smtClean="0"/>
+              <a:t>data for </a:t>
+            </a:r>
+            <a:r>
+              <a:rPr lang="en-CA" sz="1050" dirty="0" smtClean="0"/>
+              <a:t>a </a:t>
+            </a:r>
+            <a:r>
+              <a:rPr lang="en-CA" sz="1050" dirty="0" smtClean="0"/>
+              <a:t>given scenario</a:t>
             </a:r>
             <a:endParaRPr lang="en-CA" sz="1050" dirty="0"/>
           </a:p>
@@ -13996,8 +13931,8 @@
         </p:nvSpPr>
         <p:spPr>
           <a:xfrm>
-            <a:off x="6137902" y="4512079"/>
-            <a:ext cx="832160" cy="900246"/>
+            <a:off x="5447841" y="4462286"/>
+            <a:ext cx="690061" cy="1061829"/>
           </a:xfrm>
           <a:prstGeom prst="rect">
             <a:avLst/>
@@ -14017,7 +13952,15 @@
           <a:p>
             <a:r>
               <a:rPr lang="en-CA" sz="1050" dirty="0" smtClean="0"/>
-              <a:t>Maintain user’s historic data settings</a:t>
+              <a:t>Maintain user’s historic </a:t>
+            </a:r>
+            <a:r>
+              <a:rPr lang="en-CA" sz="1050" dirty="0" smtClean="0"/>
+              <a:t>data privacy </a:t>
+            </a:r>
+            <a:r>
+              <a:rPr lang="en-CA" sz="1050" dirty="0" smtClean="0"/>
+              <a:t>settings</a:t>
             </a:r>
             <a:endParaRPr lang="en-CA" sz="1050" dirty="0"/>
           </a:p>
@@ -14777,15 +14720,7 @@
           <a:p>
             <a:r>
               <a:rPr lang="en-CA" sz="1050" dirty="0" smtClean="0"/>
-              <a:t>Data </a:t>
-            </a:r>
-            <a:r>
-              <a:rPr lang="en-CA" sz="1050" dirty="0" smtClean="0"/>
-              <a:t>Manager </a:t>
-            </a:r>
-            <a:r>
-              <a:rPr lang="en-CA" sz="1050" dirty="0" smtClean="0"/>
-              <a:t>Agent</a:t>
+              <a:t>Data Manager Agent</a:t>
             </a:r>
             <a:endParaRPr lang="en-CA" sz="1050" dirty="0"/>
           </a:p>
@@ -15217,7 +15152,7 @@
           <a:p>
             <a:r>
               <a:rPr lang="en-CA" sz="1050" dirty="0" smtClean="0"/>
-              <a:t>Updating data sources/destinations</a:t>
+              <a:t>Check for data authenticity</a:t>
             </a:r>
             <a:endParaRPr lang="en-CA" sz="1050" dirty="0"/>
           </a:p>
@@ -15232,7 +15167,7 @@
         <p:spPr>
           <a:xfrm>
             <a:off x="6865651" y="4287959"/>
-            <a:ext cx="1224295" cy="577081"/>
+            <a:ext cx="1224295" cy="415498"/>
           </a:xfrm>
           <a:prstGeom prst="rect">
             <a:avLst/>
@@ -15252,7 +15187,11 @@
           <a:p>
             <a:r>
               <a:rPr lang="en-CA" sz="1050" dirty="0" smtClean="0"/>
-              <a:t>Distribute data between servers and data matching</a:t>
+              <a:t>Distribute data between </a:t>
+            </a:r>
+            <a:r>
+              <a:rPr lang="en-CA" sz="1050" dirty="0" smtClean="0"/>
+              <a:t>servers</a:t>
             </a:r>
             <a:endParaRPr lang="en-CA" sz="1050" dirty="0"/>
           </a:p>

</xml_diff>